<commit_message>
updates for SAC and kriging
</commit_message>
<xml_diff>
--- a/doc/BCB_Intro_Advanced_Analysis_1_2022.pptx
+++ b/doc/BCB_Intro_Advanced_Analysis_1_2022.pptx
@@ -6,7 +6,7 @@
     <p:sldMasterId id="2147483654" r:id="rId2"/>
   </p:sldMasterIdLst>
   <p:notesMasterIdLst>
-    <p:notesMasterId r:id="rId20"/>
+    <p:notesMasterId r:id="rId21"/>
   </p:notesMasterIdLst>
   <p:sldIdLst>
     <p:sldId id="335" r:id="rId3"/>
@@ -15,17 +15,18 @@
     <p:sldId id="440" r:id="rId6"/>
     <p:sldId id="452" r:id="rId7"/>
     <p:sldId id="453" r:id="rId8"/>
-    <p:sldId id="444" r:id="rId9"/>
-    <p:sldId id="445" r:id="rId10"/>
-    <p:sldId id="446" r:id="rId11"/>
-    <p:sldId id="447" r:id="rId12"/>
-    <p:sldId id="448" r:id="rId13"/>
-    <p:sldId id="449" r:id="rId14"/>
-    <p:sldId id="455" r:id="rId15"/>
-    <p:sldId id="450" r:id="rId16"/>
-    <p:sldId id="456" r:id="rId17"/>
-    <p:sldId id="457" r:id="rId18"/>
-    <p:sldId id="454" r:id="rId19"/>
+    <p:sldId id="458" r:id="rId9"/>
+    <p:sldId id="444" r:id="rId10"/>
+    <p:sldId id="445" r:id="rId11"/>
+    <p:sldId id="446" r:id="rId12"/>
+    <p:sldId id="447" r:id="rId13"/>
+    <p:sldId id="448" r:id="rId14"/>
+    <p:sldId id="449" r:id="rId15"/>
+    <p:sldId id="455" r:id="rId16"/>
+    <p:sldId id="450" r:id="rId17"/>
+    <p:sldId id="456" r:id="rId18"/>
+    <p:sldId id="457" r:id="rId19"/>
+    <p:sldId id="454" r:id="rId20"/>
   </p:sldIdLst>
   <p:sldSz cx="9144000" cy="5143500" type="screen16x9"/>
   <p:notesSz cx="6858000" cy="9144000"/>
@@ -235,7 +236,7 @@
           <a:p>
             <a:fld id="{8B3D4395-F4BB-4776-AD1A-E1F7520CF444}" type="datetimeFigureOut">
               <a:rPr lang="en-US" smtClean="0"/>
-              <a:t>4/15/2022</a:t>
+              <a:t>5/2/2022</a:t>
             </a:fld>
             <a:endParaRPr lang="en-US" dirty="0"/>
           </a:p>
@@ -1039,6 +1040,117 @@
           <a:bodyPr/>
           <a:lstStyle/>
           <a:p>
+            <a:r>
+              <a:rPr lang="en-US" sz="900" b="0" i="0" u="none" strike="noStrike" kern="1200" dirty="0">
+                <a:solidFill>
+                  <a:schemeClr val="tx1"/>
+                </a:solidFill>
+                <a:effectLst/>
+                <a:latin typeface="+mn-lt"/>
+                <a:ea typeface="+mn-ea"/>
+                <a:cs typeface="+mn-cs"/>
+              </a:rPr>
+              <a:t>The nugget effect can be attributed to measurement errors or spatial sources of variation at distances smaller than the sampling interval or both. </a:t>
+            </a:r>
+          </a:p>
+          <a:p>
+            <a:endParaRPr lang="en-US" sz="900" b="0" i="0" u="none" strike="noStrike" kern="1200" dirty="0">
+              <a:solidFill>
+                <a:schemeClr val="tx1"/>
+              </a:solidFill>
+              <a:effectLst/>
+              <a:latin typeface="+mn-lt"/>
+              <a:ea typeface="+mn-ea"/>
+              <a:cs typeface="+mn-cs"/>
+            </a:endParaRPr>
+          </a:p>
+          <a:p>
+            <a:r>
+              <a:rPr lang="en-US" sz="900" b="0" i="0" u="none" strike="noStrike" kern="1200" dirty="0">
+                <a:solidFill>
+                  <a:schemeClr val="tx1"/>
+                </a:solidFill>
+                <a:effectLst/>
+                <a:latin typeface="+mn-lt"/>
+                <a:ea typeface="+mn-ea"/>
+                <a:cs typeface="+mn-cs"/>
+              </a:rPr>
+              <a:t>Measurement error occurs because of the error inherent in measuring devices. Natural phenomena can vary spatially over a range of scales. </a:t>
+            </a:r>
+          </a:p>
+          <a:p>
+            <a:endParaRPr lang="en-US" sz="900" b="0" i="0" u="none" strike="noStrike" kern="1200" dirty="0">
+              <a:solidFill>
+                <a:schemeClr val="tx1"/>
+              </a:solidFill>
+              <a:effectLst/>
+              <a:latin typeface="+mn-lt"/>
+              <a:ea typeface="+mn-ea"/>
+              <a:cs typeface="+mn-cs"/>
+            </a:endParaRPr>
+          </a:p>
+          <a:p>
+            <a:r>
+              <a:rPr lang="en-US" sz="900" b="0" i="0" u="none" strike="noStrike" kern="1200" dirty="0">
+                <a:solidFill>
+                  <a:schemeClr val="tx1"/>
+                </a:solidFill>
+                <a:effectLst/>
+                <a:latin typeface="+mn-lt"/>
+                <a:ea typeface="+mn-ea"/>
+                <a:cs typeface="+mn-cs"/>
+              </a:rPr>
+              <a:t>Variation at microscales smaller than the sampling distances will appear as part of the nugget effect. Before collecting data, it is important to gain some understanding of the scales of spatial variation.</a:t>
+            </a:r>
+          </a:p>
+          <a:p>
+            <a:endParaRPr lang="en-US" sz="900" b="0" i="0" u="none" strike="noStrike" kern="1200" dirty="0">
+              <a:solidFill>
+                <a:schemeClr val="tx1"/>
+              </a:solidFill>
+              <a:effectLst/>
+              <a:latin typeface="+mn-lt"/>
+              <a:ea typeface="+mn-ea"/>
+              <a:cs typeface="+mn-cs"/>
+            </a:endParaRPr>
+          </a:p>
+          <a:p>
+            <a:r>
+              <a:rPr lang="en-US" sz="900" b="0" i="0" u="none" strike="noStrike" kern="1200" dirty="0">
+                <a:solidFill>
+                  <a:schemeClr val="tx1"/>
+                </a:solidFill>
+                <a:effectLst/>
+                <a:latin typeface="+mn-lt"/>
+                <a:ea typeface="+mn-ea"/>
+                <a:cs typeface="+mn-cs"/>
+              </a:rPr>
+              <a:t>Therefore - the nugget effect is simply the sum of measurement error and microscale variation and, since either component can be zero, the nugget effect can be composed wholly of one or the other. The distance at which the </a:t>
+            </a:r>
+            <a:r>
+              <a:rPr lang="en-US" sz="900" b="0" i="0" u="none" strike="noStrike" kern="1200" dirty="0" err="1">
+                <a:solidFill>
+                  <a:schemeClr val="tx1"/>
+                </a:solidFill>
+                <a:effectLst/>
+                <a:latin typeface="+mn-lt"/>
+                <a:ea typeface="+mn-ea"/>
+                <a:cs typeface="+mn-cs"/>
+              </a:rPr>
+              <a:t>semivariogram</a:t>
+            </a:r>
+            <a:r>
+              <a:rPr lang="en-US" sz="900" b="0" i="0" u="none" strike="noStrike" kern="1200" dirty="0">
+                <a:solidFill>
+                  <a:schemeClr val="tx1"/>
+                </a:solidFill>
+                <a:effectLst/>
+                <a:latin typeface="+mn-lt"/>
+                <a:ea typeface="+mn-ea"/>
+                <a:cs typeface="+mn-cs"/>
+              </a:rPr>
+              <a:t> levels off to the sill is called the range.</a:t>
+            </a:r>
             <a:endParaRPr lang="en-US" dirty="0"/>
           </a:p>
         </p:txBody>
@@ -1060,7 +1172,7 @@
           <a:p>
             <a:fld id="{8B0993E8-77CB-4CE8-8134-9D98A3510F3A}" type="slidenum">
               <a:rPr lang="en-US" smtClean="0"/>
-              <a:t>14</a:t>
+              <a:t>7</a:t>
             </a:fld>
             <a:endParaRPr lang="en-US" dirty="0"/>
           </a:p>
@@ -1069,7 +1181,7 @@
     </p:spTree>
     <p:extLst>
       <p:ext uri="{BB962C8B-B14F-4D97-AF65-F5344CB8AC3E}">
-        <p14:creationId xmlns:p14="http://schemas.microsoft.com/office/powerpoint/2010/main" val="4219456944"/>
+        <p14:creationId xmlns:p14="http://schemas.microsoft.com/office/powerpoint/2010/main" val="3225161193"/>
       </p:ext>
     </p:extLst>
   </p:cSld>
@@ -1153,7 +1265,7 @@
     </p:spTree>
     <p:extLst>
       <p:ext uri="{BB962C8B-B14F-4D97-AF65-F5344CB8AC3E}">
-        <p14:creationId xmlns:p14="http://schemas.microsoft.com/office/powerpoint/2010/main" val="871950714"/>
+        <p14:creationId xmlns:p14="http://schemas.microsoft.com/office/powerpoint/2010/main" val="4219456944"/>
       </p:ext>
     </p:extLst>
   </p:cSld>
@@ -1229,6 +1341,90 @@
             <a:fld id="{8B0993E8-77CB-4CE8-8134-9D98A3510F3A}" type="slidenum">
               <a:rPr lang="en-US" smtClean="0"/>
               <a:t>16</a:t>
+            </a:fld>
+            <a:endParaRPr lang="en-US" dirty="0"/>
+          </a:p>
+        </p:txBody>
+      </p:sp>
+    </p:spTree>
+    <p:extLst>
+      <p:ext uri="{BB962C8B-B14F-4D97-AF65-F5344CB8AC3E}">
+        <p14:creationId xmlns:p14="http://schemas.microsoft.com/office/powerpoint/2010/main" val="871950714"/>
+      </p:ext>
+    </p:extLst>
+  </p:cSld>
+  <p:clrMapOvr>
+    <a:masterClrMapping/>
+  </p:clrMapOvr>
+</p:notes>
+</file>
+
+<file path=ppt/notesSlides/notesSlide8.xml><?xml version="1.0" encoding="utf-8"?>
+<p:notes xmlns:a="http://schemas.openxmlformats.org/drawingml/2006/main" xmlns:r="http://schemas.openxmlformats.org/officeDocument/2006/relationships" xmlns:p="http://schemas.openxmlformats.org/presentationml/2006/main">
+  <p:cSld>
+    <p:spTree>
+      <p:nvGrpSpPr>
+        <p:cNvPr id="1" name=""/>
+        <p:cNvGrpSpPr/>
+        <p:nvPr/>
+      </p:nvGrpSpPr>
+      <p:grpSpPr>
+        <a:xfrm>
+          <a:off x="0" y="0"/>
+          <a:ext cx="0" cy="0"/>
+          <a:chOff x="0" y="0"/>
+          <a:chExt cx="0" cy="0"/>
+        </a:xfrm>
+      </p:grpSpPr>
+      <p:sp>
+        <p:nvSpPr>
+          <p:cNvPr id="2" name="Slide Image Placeholder 1"/>
+          <p:cNvSpPr>
+            <a:spLocks noGrp="1" noRot="1" noChangeAspect="1"/>
+          </p:cNvSpPr>
+          <p:nvPr>
+            <p:ph type="sldImg"/>
+          </p:nvPr>
+        </p:nvSpPr>
+        <p:spPr/>
+      </p:sp>
+      <p:sp>
+        <p:nvSpPr>
+          <p:cNvPr id="3" name="Notes Placeholder 2"/>
+          <p:cNvSpPr>
+            <a:spLocks noGrp="1"/>
+          </p:cNvSpPr>
+          <p:nvPr>
+            <p:ph type="body" idx="1"/>
+          </p:nvPr>
+        </p:nvSpPr>
+        <p:spPr/>
+        <p:txBody>
+          <a:bodyPr/>
+          <a:lstStyle/>
+          <a:p>
+            <a:endParaRPr lang="en-US" dirty="0"/>
+          </a:p>
+        </p:txBody>
+      </p:sp>
+      <p:sp>
+        <p:nvSpPr>
+          <p:cNvPr id="4" name="Slide Number Placeholder 3"/>
+          <p:cNvSpPr>
+            <a:spLocks noGrp="1"/>
+          </p:cNvSpPr>
+          <p:nvPr>
+            <p:ph type="sldNum" sz="quarter" idx="5"/>
+          </p:nvPr>
+        </p:nvSpPr>
+        <p:spPr/>
+        <p:txBody>
+          <a:bodyPr/>
+          <a:lstStyle/>
+          <a:p>
+            <a:fld id="{8B0993E8-77CB-4CE8-8134-9D98A3510F3A}" type="slidenum">
+              <a:rPr lang="en-US" smtClean="0"/>
+              <a:t>17</a:t>
             </a:fld>
             <a:endParaRPr lang="en-US" dirty="0"/>
           </a:p>
@@ -3200,7 +3396,7 @@
           <p:cNvPr id="2" name="Title 1">
             <a:extLst>
               <a:ext uri="{FF2B5EF4-FFF2-40B4-BE49-F238E27FC236}">
-                <a16:creationId xmlns:a16="http://schemas.microsoft.com/office/drawing/2014/main" id="{B09A0552-027A-E940-8B84-F6B877E6717D}"/>
+                <a16:creationId xmlns:a16="http://schemas.microsoft.com/office/drawing/2014/main" id="{53C17DB7-ABE2-9249-BA6F-B38EAAF38A07}"/>
               </a:ext>
             </a:extLst>
           </p:cNvPr>
@@ -3217,8 +3413,12 @@
           <a:lstStyle/>
           <a:p>
             <a:r>
-              <a:rPr lang="en-US" dirty="0"/>
-              <a:t>Introduction to kriging</a:t>
+              <a:rPr lang="en-US" dirty="0" err="1"/>
+              <a:t>Getis</a:t>
+            </a:r>
+            <a:r>
+              <a:rPr lang="en-US" dirty="0"/>
+              <a:t>-Ord GI*</a:t>
             </a:r>
           </a:p>
         </p:txBody>
@@ -3228,7 +3428,7 @@
           <p:cNvPr id="3" name="Text Placeholder 2">
             <a:extLst>
               <a:ext uri="{FF2B5EF4-FFF2-40B4-BE49-F238E27FC236}">
-                <a16:creationId xmlns:a16="http://schemas.microsoft.com/office/drawing/2014/main" id="{29B23574-E1AE-5D4E-A92B-41CAD1AF7D5A}"/>
+                <a16:creationId xmlns:a16="http://schemas.microsoft.com/office/drawing/2014/main" id="{1713683F-6D57-C742-BE5C-0343C0B83E59}"/>
               </a:ext>
             </a:extLst>
           </p:cNvPr>
@@ -3246,17 +3446,20 @@
           <a:p>
             <a:r>
               <a:rPr lang="en-US" dirty="0"/>
-              <a:t>2. Kriging</a:t>
-            </a:r>
-          </a:p>
-        </p:txBody>
-      </p:sp>
-      <p:sp>
-        <p:nvSpPr>
-          <p:cNvPr id="5" name="Rectangle 4">
+              <a:t>1. Spatial Autocorrelation</a:t>
+            </a:r>
+          </a:p>
+          <a:p>
+            <a:endParaRPr lang="en-US" dirty="0"/>
+          </a:p>
+        </p:txBody>
+      </p:sp>
+      <p:sp>
+        <p:nvSpPr>
+          <p:cNvPr id="4" name="Rectangle 3">
             <a:extLst>
               <a:ext uri="{FF2B5EF4-FFF2-40B4-BE49-F238E27FC236}">
-                <a16:creationId xmlns:a16="http://schemas.microsoft.com/office/drawing/2014/main" id="{81DD6188-9C46-9248-B7A2-EC5E2D7BA323}"/>
+                <a16:creationId xmlns:a16="http://schemas.microsoft.com/office/drawing/2014/main" id="{19FA0342-475B-6F44-BE4D-99B8D2851AC8}"/>
               </a:ext>
             </a:extLst>
           </p:cNvPr>
@@ -3265,8 +3468,8 @@
         </p:nvSpPr>
         <p:spPr>
           <a:xfrm>
-            <a:off x="539452" y="1553080"/>
-            <a:ext cx="8065095" cy="1815882"/>
+            <a:off x="899962" y="1308401"/>
+            <a:ext cx="3335154" cy="1815882"/>
           </a:xfrm>
           <a:prstGeom prst="rect">
             <a:avLst/>
@@ -3278,54 +3481,73 @@
           </a:bodyPr>
           <a:lstStyle/>
           <a:p>
-            <a:r>
-              <a:rPr lang="en-US" b="1" dirty="0"/>
-              <a:t>Kriging</a:t>
-            </a:r>
-            <a:r>
-              <a:rPr lang="en-US" dirty="0"/>
-              <a:t> is a group of geostatistical techniques to interpolate the value of a random field at an un-sampled location from known observations of its value at nearby locations. </a:t>
-            </a:r>
-          </a:p>
-          <a:p>
-            <a:endParaRPr lang="en-US" dirty="0"/>
-          </a:p>
-          <a:p>
-            <a:r>
-              <a:rPr lang="en-US" dirty="0"/>
-              <a:t>The main statistical assumption behind kriging is one of </a:t>
-            </a:r>
-            <a:r>
-              <a:rPr lang="en-US" b="1" dirty="0"/>
-              <a:t>stationarity</a:t>
-            </a:r>
-            <a:r>
-              <a:rPr lang="en-US" dirty="0"/>
-              <a:t> which means that statistical properties (such as </a:t>
-            </a:r>
-            <a:r>
-              <a:rPr lang="en-US" b="1" dirty="0"/>
-              <a:t>mean and variance</a:t>
-            </a:r>
-            <a:r>
-              <a:rPr lang="en-US" dirty="0"/>
-              <a:t>) do not depend on the exact spatial locations, so the mean and variance of a variable at one location is equal to the mean and variance at another location. </a:t>
-            </a:r>
-          </a:p>
-          <a:p>
-            <a:br>
-              <a:rPr lang="en-US" dirty="0"/>
-            </a:br>
             <a:endParaRPr lang="en-US" dirty="0">
-              <a:effectLst/>
+              <a:solidFill>
+                <a:srgbClr val="333333"/>
+              </a:solidFill>
+              <a:latin typeface="Source Sans Pro" panose="020B0503030403020204" pitchFamily="34" charset="0"/>
             </a:endParaRPr>
           </a:p>
-        </p:txBody>
-      </p:sp>
+          <a:p>
+            <a:r>
+              <a:rPr lang="en-US" dirty="0"/>
+              <a:t>Hotspot analysis using </a:t>
+            </a:r>
+            <a:r>
+              <a:rPr lang="en-US" i="1" u="sng" dirty="0" err="1"/>
+              <a:t>Getis</a:t>
+            </a:r>
+            <a:r>
+              <a:rPr lang="en-US" i="1" u="sng" dirty="0"/>
+              <a:t>-Ord Gi*</a:t>
+            </a:r>
+            <a:r>
+              <a:rPr lang="en-US" dirty="0"/>
+              <a:t> statistic (sometimes referred to as GI-star) uses spatial vectors to identify the locations of statistically significant hot spots and cold spots in data. The z-scores and p-values indicates where features with either high or low values cluster spatially.</a:t>
+            </a:r>
+          </a:p>
+        </p:txBody>
+      </p:sp>
+      <p:pic>
+        <p:nvPicPr>
+          <p:cNvPr id="9" name="Picture 8" descr="Map&#10;&#10;Description automatically generated">
+            <a:extLst>
+              <a:ext uri="{FF2B5EF4-FFF2-40B4-BE49-F238E27FC236}">
+                <a16:creationId xmlns:a16="http://schemas.microsoft.com/office/drawing/2014/main" id="{6779E92B-3DB5-DF4D-8EF7-5BAFBAF410D3}"/>
+              </a:ext>
+            </a:extLst>
+          </p:cNvPr>
+          <p:cNvPicPr>
+            <a:picLocks noChangeAspect="1"/>
+          </p:cNvPicPr>
+          <p:nvPr/>
+        </p:nvPicPr>
+        <p:blipFill>
+          <a:blip r:embed="rId2">
+            <a:extLst>
+              <a:ext uri="{28A0092B-C50C-407E-A947-70E740481C1C}">
+                <a14:useLocalDpi xmlns:a14="http://schemas.microsoft.com/office/drawing/2010/main" val="0"/>
+              </a:ext>
+            </a:extLst>
+          </a:blip>
+          <a:stretch>
+            <a:fillRect/>
+          </a:stretch>
+        </p:blipFill>
+        <p:spPr>
+          <a:xfrm>
+            <a:off x="4712869" y="346271"/>
+            <a:ext cx="2938219" cy="3843391"/>
+          </a:xfrm>
+          <a:prstGeom prst="rect">
+            <a:avLst/>
+          </a:prstGeom>
+        </p:spPr>
+      </p:pic>
     </p:spTree>
     <p:extLst>
       <p:ext uri="{BB962C8B-B14F-4D97-AF65-F5344CB8AC3E}">
-        <p14:creationId xmlns:p14="http://schemas.microsoft.com/office/powerpoint/2010/main" val="3849745909"/>
+        <p14:creationId xmlns:p14="http://schemas.microsoft.com/office/powerpoint/2010/main" val="3008153948"/>
       </p:ext>
     </p:extLst>
   </p:cSld>
@@ -3357,6 +3579,163 @@
           <p:cNvPr id="2" name="Title 1">
             <a:extLst>
               <a:ext uri="{FF2B5EF4-FFF2-40B4-BE49-F238E27FC236}">
+                <a16:creationId xmlns:a16="http://schemas.microsoft.com/office/drawing/2014/main" id="{B09A0552-027A-E940-8B84-F6B877E6717D}"/>
+              </a:ext>
+            </a:extLst>
+          </p:cNvPr>
+          <p:cNvSpPr>
+            <a:spLocks noGrp="1"/>
+          </p:cNvSpPr>
+          <p:nvPr>
+            <p:ph type="title"/>
+          </p:nvPr>
+        </p:nvSpPr>
+        <p:spPr/>
+        <p:txBody>
+          <a:bodyPr/>
+          <a:lstStyle/>
+          <a:p>
+            <a:r>
+              <a:rPr lang="en-US" dirty="0"/>
+              <a:t>Introduction to kriging</a:t>
+            </a:r>
+          </a:p>
+        </p:txBody>
+      </p:sp>
+      <p:sp>
+        <p:nvSpPr>
+          <p:cNvPr id="3" name="Text Placeholder 2">
+            <a:extLst>
+              <a:ext uri="{FF2B5EF4-FFF2-40B4-BE49-F238E27FC236}">
+                <a16:creationId xmlns:a16="http://schemas.microsoft.com/office/drawing/2014/main" id="{29B23574-E1AE-5D4E-A92B-41CAD1AF7D5A}"/>
+              </a:ext>
+            </a:extLst>
+          </p:cNvPr>
+          <p:cNvSpPr>
+            <a:spLocks noGrp="1"/>
+          </p:cNvSpPr>
+          <p:nvPr>
+            <p:ph type="body" sz="quarter" idx="10"/>
+          </p:nvPr>
+        </p:nvSpPr>
+        <p:spPr/>
+        <p:txBody>
+          <a:bodyPr/>
+          <a:lstStyle/>
+          <a:p>
+            <a:r>
+              <a:rPr lang="en-US" dirty="0"/>
+              <a:t>2. Kriging</a:t>
+            </a:r>
+          </a:p>
+        </p:txBody>
+      </p:sp>
+      <p:sp>
+        <p:nvSpPr>
+          <p:cNvPr id="5" name="Rectangle 4">
+            <a:extLst>
+              <a:ext uri="{FF2B5EF4-FFF2-40B4-BE49-F238E27FC236}">
+                <a16:creationId xmlns:a16="http://schemas.microsoft.com/office/drawing/2014/main" id="{81DD6188-9C46-9248-B7A2-EC5E2D7BA323}"/>
+              </a:ext>
+            </a:extLst>
+          </p:cNvPr>
+          <p:cNvSpPr/>
+          <p:nvPr/>
+        </p:nvSpPr>
+        <p:spPr>
+          <a:xfrm>
+            <a:off x="539452" y="1553080"/>
+            <a:ext cx="8065095" cy="1815882"/>
+          </a:xfrm>
+          <a:prstGeom prst="rect">
+            <a:avLst/>
+          </a:prstGeom>
+        </p:spPr>
+        <p:txBody>
+          <a:bodyPr wrap="square">
+            <a:spAutoFit/>
+          </a:bodyPr>
+          <a:lstStyle/>
+          <a:p>
+            <a:r>
+              <a:rPr lang="en-US" b="1" dirty="0"/>
+              <a:t>Kriging</a:t>
+            </a:r>
+            <a:r>
+              <a:rPr lang="en-US" dirty="0"/>
+              <a:t> is a group of geostatistical techniques to interpolate the value of a random field at an un-sampled location from known observations of its value at nearby locations. </a:t>
+            </a:r>
+          </a:p>
+          <a:p>
+            <a:endParaRPr lang="en-US" dirty="0"/>
+          </a:p>
+          <a:p>
+            <a:r>
+              <a:rPr lang="en-US" dirty="0"/>
+              <a:t>The main statistical assumption behind kriging is one of </a:t>
+            </a:r>
+            <a:r>
+              <a:rPr lang="en-US" b="1" dirty="0"/>
+              <a:t>stationarity</a:t>
+            </a:r>
+            <a:r>
+              <a:rPr lang="en-US" dirty="0"/>
+              <a:t> which means that statistical properties (such as </a:t>
+            </a:r>
+            <a:r>
+              <a:rPr lang="en-US" b="1" dirty="0"/>
+              <a:t>mean and variance</a:t>
+            </a:r>
+            <a:r>
+              <a:rPr lang="en-US" dirty="0"/>
+              <a:t>) do not depend on the exact spatial locations, so the mean and variance of a variable at one location is equal to the mean and variance at another location. </a:t>
+            </a:r>
+          </a:p>
+          <a:p>
+            <a:br>
+              <a:rPr lang="en-US" dirty="0"/>
+            </a:br>
+            <a:endParaRPr lang="en-US" dirty="0">
+              <a:effectLst/>
+            </a:endParaRPr>
+          </a:p>
+        </p:txBody>
+      </p:sp>
+    </p:spTree>
+    <p:extLst>
+      <p:ext uri="{BB962C8B-B14F-4D97-AF65-F5344CB8AC3E}">
+        <p14:creationId xmlns:p14="http://schemas.microsoft.com/office/powerpoint/2010/main" val="3849745909"/>
+      </p:ext>
+    </p:extLst>
+  </p:cSld>
+  <p:clrMapOvr>
+    <a:masterClrMapping/>
+  </p:clrMapOvr>
+</p:sld>
+</file>
+
+<file path=ppt/slides/slide12.xml><?xml version="1.0" encoding="utf-8"?>
+<p:sld xmlns:a="http://schemas.openxmlformats.org/drawingml/2006/main" xmlns:r="http://schemas.openxmlformats.org/officeDocument/2006/relationships" xmlns:p="http://schemas.openxmlformats.org/presentationml/2006/main">
+  <p:cSld>
+    <p:spTree>
+      <p:nvGrpSpPr>
+        <p:cNvPr id="1" name=""/>
+        <p:cNvGrpSpPr/>
+        <p:nvPr/>
+      </p:nvGrpSpPr>
+      <p:grpSpPr>
+        <a:xfrm>
+          <a:off x="0" y="0"/>
+          <a:ext cx="0" cy="0"/>
+          <a:chOff x="0" y="0"/>
+          <a:chExt cx="0" cy="0"/>
+        </a:xfrm>
+      </p:grpSpPr>
+      <p:sp>
+        <p:nvSpPr>
+          <p:cNvPr id="2" name="Title 1">
+            <a:extLst>
+              <a:ext uri="{FF2B5EF4-FFF2-40B4-BE49-F238E27FC236}">
                 <a16:creationId xmlns:a16="http://schemas.microsoft.com/office/drawing/2014/main" id="{C01D11B2-48E2-5C41-9D42-ADF562F68AA6}"/>
               </a:ext>
             </a:extLst>
@@ -3408,41 +3787,6 @@
           </a:p>
         </p:txBody>
       </p:sp>
-      <p:pic>
-        <p:nvPicPr>
-          <p:cNvPr id="7" name="Picture 6" descr="Graphical user interface, text&#10;&#10;Description automatically generated">
-            <a:extLst>
-              <a:ext uri="{FF2B5EF4-FFF2-40B4-BE49-F238E27FC236}">
-                <a16:creationId xmlns:a16="http://schemas.microsoft.com/office/drawing/2014/main" id="{1E5A53DD-EDD8-BB4D-B857-156D4143AD58}"/>
-              </a:ext>
-            </a:extLst>
-          </p:cNvPr>
-          <p:cNvPicPr>
-            <a:picLocks noChangeAspect="1"/>
-          </p:cNvPicPr>
-          <p:nvPr/>
-        </p:nvPicPr>
-        <p:blipFill rotWithShape="1">
-          <a:blip r:embed="rId2">
-            <a:extLst>
-              <a:ext uri="{28A0092B-C50C-407E-A947-70E740481C1C}">
-                <a14:useLocalDpi xmlns:a14="http://schemas.microsoft.com/office/drawing/2010/main" val="0"/>
-              </a:ext>
-            </a:extLst>
-          </a:blip>
-          <a:srcRect l="2256" t="2068" r="23267" b="-2068"/>
-          <a:stretch/>
-        </p:blipFill>
-        <p:spPr>
-          <a:xfrm>
-            <a:off x="5467150" y="1319294"/>
-            <a:ext cx="3436219" cy="2504912"/>
-          </a:xfrm>
-          <a:prstGeom prst="rect">
-            <a:avLst/>
-          </a:prstGeom>
-        </p:spPr>
-      </p:pic>
       <p:sp>
         <p:nvSpPr>
           <p:cNvPr id="8" name="Rectangle 7">
@@ -3491,6 +3835,42 @@
           </a:p>
         </p:txBody>
       </p:sp>
+      <p:pic>
+        <p:nvPicPr>
+          <p:cNvPr id="6" name="Picture 5" descr="Text&#10;&#10;Description automatically generated">
+            <a:extLst>
+              <a:ext uri="{FF2B5EF4-FFF2-40B4-BE49-F238E27FC236}">
+                <a16:creationId xmlns:a16="http://schemas.microsoft.com/office/drawing/2014/main" id="{D4386DFE-5737-40ED-AE07-D6C80A16CCA5}"/>
+              </a:ext>
+            </a:extLst>
+          </p:cNvPr>
+          <p:cNvPicPr>
+            <a:picLocks noChangeAspect="1"/>
+          </p:cNvPicPr>
+          <p:nvPr/>
+        </p:nvPicPr>
+        <p:blipFill>
+          <a:blip r:embed="rId2">
+            <a:extLst>
+              <a:ext uri="{28A0092B-C50C-407E-A947-70E740481C1C}">
+                <a14:useLocalDpi xmlns:a14="http://schemas.microsoft.com/office/drawing/2010/main" val="0"/>
+              </a:ext>
+            </a:extLst>
+          </a:blip>
+          <a:stretch>
+            <a:fillRect/>
+          </a:stretch>
+        </p:blipFill>
+        <p:spPr>
+          <a:xfrm>
+            <a:off x="5332326" y="1264381"/>
+            <a:ext cx="3811674" cy="2437397"/>
+          </a:xfrm>
+          <a:prstGeom prst="rect">
+            <a:avLst/>
+          </a:prstGeom>
+        </p:spPr>
+      </p:pic>
     </p:spTree>
     <p:extLst>
       <p:ext uri="{BB962C8B-B14F-4D97-AF65-F5344CB8AC3E}">
@@ -3504,7 +3884,7 @@
 </p:sld>
 </file>
 
-<file path=ppt/slides/slide12.xml><?xml version="1.0" encoding="utf-8"?>
+<file path=ppt/slides/slide13.xml><?xml version="1.0" encoding="utf-8"?>
 <p:sld xmlns:a="http://schemas.openxmlformats.org/drawingml/2006/main" xmlns:r="http://schemas.openxmlformats.org/officeDocument/2006/relationships" xmlns:p="http://schemas.openxmlformats.org/presentationml/2006/main">
   <p:cSld>
     <p:spTree>
@@ -3646,7 +4026,7 @@
         </p:blipFill>
         <p:spPr>
           <a:xfrm>
-            <a:off x="5207869" y="1180536"/>
+            <a:off x="5185291" y="1255043"/>
             <a:ext cx="3811674" cy="2437397"/>
           </a:xfrm>
           <a:prstGeom prst="rect">
@@ -3654,6 +4034,67 @@
           </a:prstGeom>
         </p:spPr>
       </p:pic>
+      <p:sp>
+        <p:nvSpPr>
+          <p:cNvPr id="8" name="TextBox 7">
+            <a:extLst>
+              <a:ext uri="{FF2B5EF4-FFF2-40B4-BE49-F238E27FC236}">
+                <a16:creationId xmlns:a16="http://schemas.microsoft.com/office/drawing/2014/main" id="{F2C35C38-C2F3-41DB-8B2D-3B6315285854}"/>
+              </a:ext>
+            </a:extLst>
+          </p:cNvPr>
+          <p:cNvSpPr txBox="1"/>
+          <p:nvPr/>
+        </p:nvSpPr>
+        <p:spPr>
+          <a:xfrm>
+            <a:off x="1050804" y="3617933"/>
+            <a:ext cx="8037689" cy="738664"/>
+          </a:xfrm>
+          <a:prstGeom prst="rect">
+            <a:avLst/>
+          </a:prstGeom>
+          <a:noFill/>
+        </p:spPr>
+        <p:txBody>
+          <a:bodyPr wrap="square">
+            <a:spAutoFit/>
+          </a:bodyPr>
+          <a:lstStyle/>
+          <a:p>
+            <a:r>
+              <a:rPr lang="en-US" b="0" i="0" dirty="0">
+                <a:solidFill>
+                  <a:srgbClr val="4D4D4D"/>
+                </a:solidFill>
+                <a:effectLst/>
+                <a:latin typeface="Lucida Grande"/>
+              </a:rPr>
+              <a:t>In IDW, the weight</a:t>
+            </a:r>
+            <a:r>
+              <a:rPr lang="en-US" dirty="0">
+                <a:solidFill>
+                  <a:srgbClr val="4D4D4D"/>
+                </a:solidFill>
+                <a:latin typeface="Lucida Grande"/>
+              </a:rPr>
+              <a:t> </a:t>
+            </a:r>
+            <a:r>
+              <a:rPr lang="en-US" b="0" i="0" dirty="0">
+                <a:solidFill>
+                  <a:srgbClr val="4D4D4D"/>
+                </a:solidFill>
+                <a:effectLst/>
+                <a:latin typeface="Lucida Grande"/>
+              </a:rPr>
+              <a:t>depends solely on the distance to the prediction location. However, with the kriging method, the weights are based not only on the distance between the measured points and the prediction location but also on the overall spatial arrangement of the measured points</a:t>
+            </a:r>
+            <a:endParaRPr lang="en-US" dirty="0"/>
+          </a:p>
+        </p:txBody>
+      </p:sp>
     </p:spTree>
     <p:extLst>
       <p:ext uri="{BB962C8B-B14F-4D97-AF65-F5344CB8AC3E}">
@@ -3664,10 +4105,96 @@
   <p:clrMapOvr>
     <a:masterClrMapping/>
   </p:clrMapOvr>
+  <p:timing>
+    <p:tnLst>
+      <p:par>
+        <p:cTn id="1" dur="indefinite" restart="never" nodeType="tmRoot">
+          <p:childTnLst>
+            <p:seq concurrent="1" nextAc="seek">
+              <p:cTn id="2" dur="indefinite" nodeType="mainSeq">
+                <p:childTnLst>
+                  <p:par>
+                    <p:cTn id="3" fill="hold">
+                      <p:stCondLst>
+                        <p:cond delay="indefinite"/>
+                      </p:stCondLst>
+                      <p:childTnLst>
+                        <p:par>
+                          <p:cTn id="4" fill="hold">
+                            <p:stCondLst>
+                              <p:cond delay="0"/>
+                            </p:stCondLst>
+                            <p:childTnLst>
+                              <p:par>
+                                <p:cTn id="5" presetID="10" presetClass="entr" presetSubtype="0" fill="hold" grpId="0" nodeType="clickEffect">
+                                  <p:stCondLst>
+                                    <p:cond delay="0"/>
+                                  </p:stCondLst>
+                                  <p:childTnLst>
+                                    <p:set>
+                                      <p:cBhvr>
+                                        <p:cTn id="6" dur="1" fill="hold">
+                                          <p:stCondLst>
+                                            <p:cond delay="0"/>
+                                          </p:stCondLst>
+                                        </p:cTn>
+                                        <p:tgtEl>
+                                          <p:spTgt spid="8"/>
+                                        </p:tgtEl>
+                                        <p:attrNameLst>
+                                          <p:attrName>style.visibility</p:attrName>
+                                        </p:attrNameLst>
+                                      </p:cBhvr>
+                                      <p:to>
+                                        <p:strVal val="visible"/>
+                                      </p:to>
+                                    </p:set>
+                                    <p:animEffect transition="in" filter="fade">
+                                      <p:cBhvr>
+                                        <p:cTn id="7" dur="500"/>
+                                        <p:tgtEl>
+                                          <p:spTgt spid="8"/>
+                                        </p:tgtEl>
+                                      </p:cBhvr>
+                                    </p:animEffect>
+                                  </p:childTnLst>
+                                </p:cTn>
+                              </p:par>
+                            </p:childTnLst>
+                          </p:cTn>
+                        </p:par>
+                      </p:childTnLst>
+                    </p:cTn>
+                  </p:par>
+                </p:childTnLst>
+              </p:cTn>
+              <p:prevCondLst>
+                <p:cond evt="onPrev" delay="0">
+                  <p:tgtEl>
+                    <p:sldTgt/>
+                  </p:tgtEl>
+                </p:cond>
+              </p:prevCondLst>
+              <p:nextCondLst>
+                <p:cond evt="onNext" delay="0">
+                  <p:tgtEl>
+                    <p:sldTgt/>
+                  </p:tgtEl>
+                </p:cond>
+              </p:nextCondLst>
+            </p:seq>
+          </p:childTnLst>
+        </p:cTn>
+      </p:par>
+    </p:tnLst>
+    <p:bldLst>
+      <p:bldP spid="8" grpId="0"/>
+    </p:bldLst>
+  </p:timing>
 </p:sld>
 </file>
 
-<file path=ppt/slides/slide13.xml><?xml version="1.0" encoding="utf-8"?>
+<file path=ppt/slides/slide14.xml><?xml version="1.0" encoding="utf-8"?>
 <p:sld xmlns:a="http://schemas.openxmlformats.org/drawingml/2006/main" xmlns:r="http://schemas.openxmlformats.org/officeDocument/2006/relationships" xmlns:p="http://schemas.openxmlformats.org/presentationml/2006/main">
   <p:cSld>
     <p:spTree>
@@ -3988,7 +4515,7 @@
 </p:sld>
 </file>
 
-<file path=ppt/slides/slide14.xml><?xml version="1.0" encoding="utf-8"?>
+<file path=ppt/slides/slide15.xml><?xml version="1.0" encoding="utf-8"?>
 <p:sld xmlns:a="http://schemas.openxmlformats.org/drawingml/2006/main" xmlns:r="http://schemas.openxmlformats.org/officeDocument/2006/relationships" xmlns:p="http://schemas.openxmlformats.org/presentationml/2006/main">
   <p:cSld>
     <p:spTree>
@@ -4298,7 +4825,7 @@
 </p:sld>
 </file>
 
-<file path=ppt/slides/slide15.xml><?xml version="1.0" encoding="utf-8"?>
+<file path=ppt/slides/slide16.xml><?xml version="1.0" encoding="utf-8"?>
 <p:sld xmlns:a="http://schemas.openxmlformats.org/drawingml/2006/main" xmlns:r="http://schemas.openxmlformats.org/officeDocument/2006/relationships" xmlns:p="http://schemas.openxmlformats.org/presentationml/2006/main">
   <p:cSld>
     <p:spTree>
@@ -4713,7 +5240,7 @@
 </p:sld>
 </file>
 
-<file path=ppt/slides/slide16.xml><?xml version="1.0" encoding="utf-8"?>
+<file path=ppt/slides/slide17.xml><?xml version="1.0" encoding="utf-8"?>
 <p:sld xmlns:a="http://schemas.openxmlformats.org/drawingml/2006/main" xmlns:r="http://schemas.openxmlformats.org/officeDocument/2006/relationships" xmlns:p="http://schemas.openxmlformats.org/presentationml/2006/main">
   <p:cSld>
     <p:spTree>
@@ -5060,7 +5587,7 @@
 </p:sld>
 </file>
 
-<file path=ppt/slides/slide17.xml><?xml version="1.0" encoding="utf-8"?>
+<file path=ppt/slides/slide18.xml><?xml version="1.0" encoding="utf-8"?>
 <p:sld xmlns:a="http://schemas.openxmlformats.org/drawingml/2006/main" xmlns:r="http://schemas.openxmlformats.org/officeDocument/2006/relationships" xmlns:p="http://schemas.openxmlformats.org/presentationml/2006/main">
   <p:cSld>
     <p:spTree>
@@ -6337,6 +6864,580 @@
       </p:sp>
       <p:pic>
         <p:nvPicPr>
+          <p:cNvPr id="5" name="Picture 4" descr="Diagram, schematic&#10;&#10;Description automatically generated">
+            <a:extLst>
+              <a:ext uri="{FF2B5EF4-FFF2-40B4-BE49-F238E27FC236}">
+                <a16:creationId xmlns:a16="http://schemas.microsoft.com/office/drawing/2014/main" id="{FC3DE18F-6C10-4E80-A76D-E64B2B4F3A0C}"/>
+              </a:ext>
+            </a:extLst>
+          </p:cNvPr>
+          <p:cNvPicPr>
+            <a:picLocks noChangeAspect="1"/>
+          </p:cNvPicPr>
+          <p:nvPr/>
+        </p:nvPicPr>
+        <p:blipFill>
+          <a:blip r:embed="rId3">
+            <a:extLst>
+              <a:ext uri="{28A0092B-C50C-407E-A947-70E740481C1C}">
+                <a14:useLocalDpi xmlns:a14="http://schemas.microsoft.com/office/drawing/2010/main" val="0"/>
+              </a:ext>
+            </a:extLst>
+          </a:blip>
+          <a:stretch>
+            <a:fillRect/>
+          </a:stretch>
+        </p:blipFill>
+        <p:spPr>
+          <a:xfrm>
+            <a:off x="809977" y="1017235"/>
+            <a:ext cx="3810000" cy="3267075"/>
+          </a:xfrm>
+          <a:prstGeom prst="rect">
+            <a:avLst/>
+          </a:prstGeom>
+        </p:spPr>
+      </p:pic>
+      <p:sp>
+        <p:nvSpPr>
+          <p:cNvPr id="11" name="TextBox 10">
+            <a:extLst>
+              <a:ext uri="{FF2B5EF4-FFF2-40B4-BE49-F238E27FC236}">
+                <a16:creationId xmlns:a16="http://schemas.microsoft.com/office/drawing/2014/main" id="{22A70206-4887-43F0-97BB-44F5507DF02D}"/>
+              </a:ext>
+            </a:extLst>
+          </p:cNvPr>
+          <p:cNvSpPr txBox="1"/>
+          <p:nvPr/>
+        </p:nvSpPr>
+        <p:spPr>
+          <a:xfrm>
+            <a:off x="4921956" y="1181139"/>
+            <a:ext cx="3854068" cy="2939266"/>
+          </a:xfrm>
+          <a:prstGeom prst="rect">
+            <a:avLst/>
+          </a:prstGeom>
+          <a:noFill/>
+        </p:spPr>
+        <p:txBody>
+          <a:bodyPr wrap="square">
+            <a:spAutoFit/>
+          </a:bodyPr>
+          <a:lstStyle/>
+          <a:p>
+            <a:pPr marL="0" marR="0" lvl="0" indent="0" algn="l" defTabSz="914400" rtl="0" eaLnBrk="0" fontAlgn="base" latinLnBrk="0" hangingPunct="0">
+              <a:lnSpc>
+                <a:spcPct val="100000"/>
+              </a:lnSpc>
+              <a:spcBef>
+                <a:spcPct val="0"/>
+              </a:spcBef>
+              <a:spcAft>
+                <a:spcPct val="0"/>
+              </a:spcAft>
+              <a:buClrTx/>
+              <a:buSzTx/>
+              <a:buFontTx/>
+              <a:buNone/>
+              <a:tabLst/>
+            </a:pPr>
+            <a:r>
+              <a:rPr kumimoji="0" lang="en-US" altLang="en-US" sz="1400" b="0" i="0" u="none" strike="noStrike" cap="none" normalizeH="0" baseline="0" dirty="0">
+                <a:ln>
+                  <a:noFill/>
+                </a:ln>
+                <a:solidFill>
+                  <a:srgbClr val="4D4D4D"/>
+                </a:solidFill>
+                <a:effectLst/>
+                <a:latin typeface="Lucida Grande"/>
+              </a:rPr>
+              <a:t>Fitting a model, or spatial modeling, is also known as structural analysis, or </a:t>
+            </a:r>
+            <a:r>
+              <a:rPr kumimoji="0" lang="en-US" altLang="en-US" sz="1400" b="0" i="0" u="none" strike="noStrike" cap="none" normalizeH="0" baseline="0" dirty="0" err="1">
+                <a:ln>
+                  <a:noFill/>
+                </a:ln>
+                <a:solidFill>
+                  <a:srgbClr val="4D4D4D"/>
+                </a:solidFill>
+                <a:effectLst/>
+                <a:latin typeface="Lucida Grande"/>
+              </a:rPr>
+              <a:t>variography</a:t>
+            </a:r>
+            <a:r>
+              <a:rPr kumimoji="0" lang="en-US" altLang="en-US" sz="1400" b="0" i="0" u="none" strike="noStrike" cap="none" normalizeH="0" baseline="0" dirty="0">
+                <a:ln>
+                  <a:noFill/>
+                </a:ln>
+                <a:solidFill>
+                  <a:srgbClr val="4D4D4D"/>
+                </a:solidFill>
+                <a:effectLst/>
+                <a:latin typeface="Lucida Grande"/>
+              </a:rPr>
+              <a:t>. In spatial modeling of the structure of the measured points, you begin with a graph of the empirical </a:t>
+            </a:r>
+            <a:r>
+              <a:rPr kumimoji="0" lang="en-US" altLang="en-US" sz="1400" b="0" i="0" u="none" strike="noStrike" cap="none" normalizeH="0" baseline="0" dirty="0" err="1">
+                <a:ln>
+                  <a:noFill/>
+                </a:ln>
+                <a:solidFill>
+                  <a:srgbClr val="4D4D4D"/>
+                </a:solidFill>
+                <a:effectLst/>
+                <a:latin typeface="Lucida Grande"/>
+              </a:rPr>
+              <a:t>semivariogram</a:t>
+            </a:r>
+            <a:r>
+              <a:rPr kumimoji="0" lang="en-US" altLang="en-US" sz="1400" b="0" i="0" u="none" strike="noStrike" cap="none" normalizeH="0" baseline="0" dirty="0">
+                <a:ln>
+                  <a:noFill/>
+                </a:ln>
+                <a:solidFill>
+                  <a:srgbClr val="4D4D4D"/>
+                </a:solidFill>
+                <a:effectLst/>
+                <a:latin typeface="Lucida Grande"/>
+              </a:rPr>
+              <a:t>, computed with the following equation for all pairs of locations separated by distance </a:t>
+            </a:r>
+            <a:r>
+              <a:rPr kumimoji="0" lang="en-US" altLang="en-US" sz="1400" b="1" i="0" u="none" strike="noStrike" cap="none" normalizeH="0" baseline="0" dirty="0">
+                <a:ln>
+                  <a:noFill/>
+                </a:ln>
+                <a:solidFill>
+                  <a:srgbClr val="4D4D4D"/>
+                </a:solidFill>
+                <a:effectLst/>
+                <a:latin typeface="Consolas" panose="020B0609020204030204" pitchFamily="49" charset="0"/>
+              </a:rPr>
+              <a:t>h</a:t>
+            </a:r>
+            <a:r>
+              <a:rPr kumimoji="0" lang="en-US" altLang="en-US" sz="1400" b="0" i="0" u="none" strike="noStrike" cap="none" normalizeH="0" baseline="0" dirty="0">
+                <a:ln>
+                  <a:noFill/>
+                </a:ln>
+                <a:solidFill>
+                  <a:srgbClr val="4D4D4D"/>
+                </a:solidFill>
+                <a:effectLst/>
+                <a:latin typeface="Lucida Grande"/>
+              </a:rPr>
+              <a:t>:</a:t>
+            </a:r>
+          </a:p>
+          <a:p>
+            <a:pPr marL="0" marR="0" lvl="0" indent="0" algn="l" defTabSz="914400" rtl="0" eaLnBrk="0" fontAlgn="base" latinLnBrk="0" hangingPunct="0">
+              <a:lnSpc>
+                <a:spcPct val="100000"/>
+              </a:lnSpc>
+              <a:spcBef>
+                <a:spcPct val="0"/>
+              </a:spcBef>
+              <a:spcAft>
+                <a:spcPct val="0"/>
+              </a:spcAft>
+              <a:buClrTx/>
+              <a:buSzTx/>
+              <a:buFontTx/>
+              <a:buNone/>
+              <a:tabLst/>
+            </a:pPr>
+            <a:endParaRPr kumimoji="0" lang="en-US" altLang="en-US" sz="800" b="0" i="0" u="none" strike="noStrike" cap="none" normalizeH="0" baseline="0" dirty="0">
+              <a:ln>
+                <a:noFill/>
+              </a:ln>
+              <a:solidFill>
+                <a:srgbClr val="4D4D4D"/>
+              </a:solidFill>
+              <a:effectLst/>
+              <a:latin typeface="Consolas" panose="020B0609020204030204" pitchFamily="49" charset="0"/>
+            </a:endParaRPr>
+          </a:p>
+          <a:p>
+            <a:pPr marL="0" marR="0" lvl="0" indent="0" algn="l" defTabSz="914400" rtl="0" eaLnBrk="0" fontAlgn="base" latinLnBrk="0" hangingPunct="0">
+              <a:lnSpc>
+                <a:spcPct val="100000"/>
+              </a:lnSpc>
+              <a:spcBef>
+                <a:spcPct val="0"/>
+              </a:spcBef>
+              <a:spcAft>
+                <a:spcPct val="0"/>
+              </a:spcAft>
+              <a:buClrTx/>
+              <a:buSzTx/>
+              <a:buFontTx/>
+              <a:buNone/>
+              <a:tabLst/>
+            </a:pPr>
+            <a:r>
+              <a:rPr kumimoji="0" lang="en-US" altLang="en-US" b="0" i="0" u="none" strike="noStrike" cap="none" normalizeH="0" baseline="0" dirty="0" err="1">
+                <a:ln>
+                  <a:noFill/>
+                </a:ln>
+                <a:solidFill>
+                  <a:srgbClr val="4D4D4D"/>
+                </a:solidFill>
+                <a:effectLst/>
+                <a:latin typeface="Consolas" panose="020B0609020204030204" pitchFamily="49" charset="0"/>
+              </a:rPr>
+              <a:t>Semivariogram</a:t>
+            </a:r>
+            <a:r>
+              <a:rPr kumimoji="0" lang="en-US" altLang="en-US" b="0" i="0" u="none" strike="noStrike" cap="none" normalizeH="0" baseline="0" dirty="0">
+                <a:ln>
+                  <a:noFill/>
+                </a:ln>
+                <a:solidFill>
+                  <a:srgbClr val="4D4D4D"/>
+                </a:solidFill>
+                <a:effectLst/>
+                <a:latin typeface="Consolas" panose="020B0609020204030204" pitchFamily="49" charset="0"/>
+              </a:rPr>
+              <a:t>(</a:t>
+            </a:r>
+            <a:r>
+              <a:rPr kumimoji="0" lang="en-US" altLang="en-US" b="0" i="0" u="none" strike="noStrike" cap="none" normalizeH="0" baseline="0" dirty="0" err="1">
+                <a:ln>
+                  <a:noFill/>
+                </a:ln>
+                <a:solidFill>
+                  <a:srgbClr val="4D4D4D"/>
+                </a:solidFill>
+                <a:effectLst/>
+                <a:latin typeface="Consolas" panose="020B0609020204030204" pitchFamily="49" charset="0"/>
+              </a:rPr>
+              <a:t>distance</a:t>
+            </a:r>
+            <a:r>
+              <a:rPr kumimoji="0" lang="en-US" altLang="en-US" b="0" i="0" u="none" strike="noStrike" cap="none" normalizeH="0" baseline="-30000" dirty="0" err="1">
+                <a:ln>
+                  <a:noFill/>
+                </a:ln>
+                <a:solidFill>
+                  <a:srgbClr val="4D4D4D"/>
+                </a:solidFill>
+                <a:effectLst/>
+                <a:latin typeface="Consolas" panose="020B0609020204030204" pitchFamily="49" charset="0"/>
+              </a:rPr>
+              <a:t>h</a:t>
+            </a:r>
+            <a:r>
+              <a:rPr kumimoji="0" lang="en-US" altLang="en-US" b="0" i="0" u="none" strike="noStrike" cap="none" normalizeH="0" baseline="0" dirty="0">
+                <a:ln>
+                  <a:noFill/>
+                </a:ln>
+                <a:solidFill>
+                  <a:srgbClr val="4D4D4D"/>
+                </a:solidFill>
+                <a:effectLst/>
+                <a:latin typeface="Consolas" panose="020B0609020204030204" pitchFamily="49" charset="0"/>
+              </a:rPr>
+              <a:t>) = 0.5 * average((</a:t>
+            </a:r>
+            <a:r>
+              <a:rPr kumimoji="0" lang="en-US" altLang="en-US" b="0" i="0" u="none" strike="noStrike" cap="none" normalizeH="0" baseline="0" dirty="0" err="1">
+                <a:ln>
+                  <a:noFill/>
+                </a:ln>
+                <a:solidFill>
+                  <a:srgbClr val="4D4D4D"/>
+                </a:solidFill>
+                <a:effectLst/>
+                <a:latin typeface="Consolas" panose="020B0609020204030204" pitchFamily="49" charset="0"/>
+              </a:rPr>
+              <a:t>value</a:t>
+            </a:r>
+            <a:r>
+              <a:rPr kumimoji="0" lang="en-US" altLang="en-US" b="0" i="0" u="none" strike="noStrike" cap="none" normalizeH="0" baseline="-30000" dirty="0" err="1">
+                <a:ln>
+                  <a:noFill/>
+                </a:ln>
+                <a:solidFill>
+                  <a:srgbClr val="4D4D4D"/>
+                </a:solidFill>
+                <a:effectLst/>
+                <a:latin typeface="Consolas" panose="020B0609020204030204" pitchFamily="49" charset="0"/>
+              </a:rPr>
+              <a:t>i</a:t>
+            </a:r>
+            <a:r>
+              <a:rPr kumimoji="0" lang="en-US" altLang="en-US" b="0" i="0" u="none" strike="noStrike" cap="none" normalizeH="0" baseline="0" dirty="0">
+                <a:ln>
+                  <a:noFill/>
+                </a:ln>
+                <a:solidFill>
+                  <a:srgbClr val="4D4D4D"/>
+                </a:solidFill>
+                <a:effectLst/>
+                <a:latin typeface="Consolas" panose="020B0609020204030204" pitchFamily="49" charset="0"/>
+              </a:rPr>
+              <a:t> – </a:t>
+            </a:r>
+            <a:r>
+              <a:rPr kumimoji="0" lang="en-US" altLang="en-US" b="0" i="0" u="none" strike="noStrike" cap="none" normalizeH="0" baseline="0" dirty="0" err="1">
+                <a:ln>
+                  <a:noFill/>
+                </a:ln>
+                <a:solidFill>
+                  <a:srgbClr val="4D4D4D"/>
+                </a:solidFill>
+                <a:effectLst/>
+                <a:latin typeface="Consolas" panose="020B0609020204030204" pitchFamily="49" charset="0"/>
+              </a:rPr>
+              <a:t>value</a:t>
+            </a:r>
+            <a:r>
+              <a:rPr kumimoji="0" lang="en-US" altLang="en-US" b="0" i="0" u="none" strike="noStrike" cap="none" normalizeH="0" baseline="-30000" dirty="0" err="1">
+                <a:ln>
+                  <a:noFill/>
+                </a:ln>
+                <a:solidFill>
+                  <a:srgbClr val="4D4D4D"/>
+                </a:solidFill>
+                <a:effectLst/>
+                <a:latin typeface="Consolas" panose="020B0609020204030204" pitchFamily="49" charset="0"/>
+              </a:rPr>
+              <a:t>j</a:t>
+            </a:r>
+            <a:r>
+              <a:rPr kumimoji="0" lang="en-US" altLang="en-US" b="0" i="0" u="none" strike="noStrike" cap="none" normalizeH="0" baseline="0" dirty="0">
+                <a:ln>
+                  <a:noFill/>
+                </a:ln>
+                <a:solidFill>
+                  <a:srgbClr val="4D4D4D"/>
+                </a:solidFill>
+                <a:effectLst/>
+                <a:latin typeface="Consolas" panose="020B0609020204030204" pitchFamily="49" charset="0"/>
+              </a:rPr>
+              <a:t>)</a:t>
+            </a:r>
+            <a:r>
+              <a:rPr kumimoji="0" lang="en-US" altLang="en-US" b="0" i="0" u="none" strike="noStrike" cap="none" normalizeH="0" baseline="30000" dirty="0">
+                <a:ln>
+                  <a:noFill/>
+                </a:ln>
+                <a:solidFill>
+                  <a:srgbClr val="4D4D4D"/>
+                </a:solidFill>
+                <a:effectLst/>
+                <a:latin typeface="Consolas" panose="020B0609020204030204" pitchFamily="49" charset="0"/>
+              </a:rPr>
+              <a:t>2</a:t>
+            </a:r>
+            <a:r>
+              <a:rPr kumimoji="0" lang="en-US" altLang="en-US" b="0" i="0" u="none" strike="noStrike" cap="none" normalizeH="0" baseline="0" dirty="0">
+                <a:ln>
+                  <a:noFill/>
+                </a:ln>
+                <a:solidFill>
+                  <a:srgbClr val="4D4D4D"/>
+                </a:solidFill>
+                <a:effectLst/>
+                <a:latin typeface="Consolas" panose="020B0609020204030204" pitchFamily="49" charset="0"/>
+              </a:rPr>
+              <a:t>)</a:t>
+            </a:r>
+          </a:p>
+          <a:p>
+            <a:pPr marL="0" marR="0" lvl="0" indent="0" algn="l" defTabSz="914400" rtl="0" eaLnBrk="0" fontAlgn="base" latinLnBrk="0" hangingPunct="0">
+              <a:lnSpc>
+                <a:spcPct val="100000"/>
+              </a:lnSpc>
+              <a:spcBef>
+                <a:spcPct val="0"/>
+              </a:spcBef>
+              <a:spcAft>
+                <a:spcPct val="0"/>
+              </a:spcAft>
+              <a:buClrTx/>
+              <a:buSzTx/>
+              <a:buFontTx/>
+              <a:buNone/>
+              <a:tabLst/>
+            </a:pPr>
+            <a:endParaRPr lang="en-US" altLang="en-US" sz="800" dirty="0">
+              <a:solidFill>
+                <a:srgbClr val="4D4D4D"/>
+              </a:solidFill>
+              <a:latin typeface="Consolas" panose="020B0609020204030204" pitchFamily="49" charset="0"/>
+            </a:endParaRPr>
+          </a:p>
+          <a:p>
+            <a:pPr marL="0" marR="0" lvl="0" indent="0" algn="l" defTabSz="914400" rtl="0" eaLnBrk="0" fontAlgn="base" latinLnBrk="0" hangingPunct="0">
+              <a:lnSpc>
+                <a:spcPct val="100000"/>
+              </a:lnSpc>
+              <a:spcBef>
+                <a:spcPct val="0"/>
+              </a:spcBef>
+              <a:spcAft>
+                <a:spcPct val="0"/>
+              </a:spcAft>
+              <a:buClrTx/>
+              <a:buSzTx/>
+              <a:buFontTx/>
+              <a:buNone/>
+              <a:tabLst/>
+            </a:pPr>
+            <a:endParaRPr kumimoji="0" lang="en-US" altLang="en-US" sz="100" b="0" i="0" u="none" strike="noStrike" cap="none" normalizeH="0" baseline="0" dirty="0">
+              <a:ln>
+                <a:noFill/>
+              </a:ln>
+              <a:solidFill>
+                <a:schemeClr val="tx1"/>
+              </a:solidFill>
+              <a:effectLst/>
+            </a:endParaRPr>
+          </a:p>
+          <a:p>
+            <a:pPr marL="0" marR="0" lvl="0" indent="0" algn="l" defTabSz="914400" rtl="0" eaLnBrk="0" fontAlgn="base" latinLnBrk="0" hangingPunct="0">
+              <a:lnSpc>
+                <a:spcPct val="100000"/>
+              </a:lnSpc>
+              <a:spcBef>
+                <a:spcPct val="0"/>
+              </a:spcBef>
+              <a:spcAft>
+                <a:spcPct val="0"/>
+              </a:spcAft>
+              <a:buClrTx/>
+              <a:buSzTx/>
+              <a:buFontTx/>
+              <a:buNone/>
+              <a:tabLst/>
+            </a:pPr>
+            <a:r>
+              <a:rPr kumimoji="0" lang="en-US" altLang="en-US" sz="1400" b="0" i="0" u="none" strike="noStrike" cap="none" normalizeH="0" baseline="0" dirty="0">
+                <a:ln>
+                  <a:noFill/>
+                </a:ln>
+                <a:solidFill>
+                  <a:srgbClr val="4D4D4D"/>
+                </a:solidFill>
+                <a:effectLst/>
+                <a:latin typeface="Lucida Grande"/>
+              </a:rPr>
+              <a:t>The formula involves calculating the difference squared between the values of the paired locations.</a:t>
+            </a:r>
+            <a:endParaRPr kumimoji="0" lang="en-US" altLang="en-US" sz="1400" b="0" i="0" u="none" strike="noStrike" cap="none" normalizeH="0" baseline="0" dirty="0">
+              <a:ln>
+                <a:noFill/>
+              </a:ln>
+              <a:solidFill>
+                <a:schemeClr val="tx1"/>
+              </a:solidFill>
+              <a:effectLst/>
+            </a:endParaRPr>
+          </a:p>
+        </p:txBody>
+      </p:sp>
+    </p:spTree>
+    <p:extLst>
+      <p:ext uri="{BB962C8B-B14F-4D97-AF65-F5344CB8AC3E}">
+        <p14:creationId xmlns:p14="http://schemas.microsoft.com/office/powerpoint/2010/main" val="2150130493"/>
+      </p:ext>
+    </p:extLst>
+  </p:cSld>
+  <p:clrMapOvr>
+    <a:masterClrMapping/>
+  </p:clrMapOvr>
+</p:sld>
+</file>
+
+<file path=ppt/slides/slide7.xml><?xml version="1.0" encoding="utf-8"?>
+<p:sld xmlns:a="http://schemas.openxmlformats.org/drawingml/2006/main" xmlns:r="http://schemas.openxmlformats.org/officeDocument/2006/relationships" xmlns:p="http://schemas.openxmlformats.org/presentationml/2006/main">
+  <p:cSld>
+    <p:spTree>
+      <p:nvGrpSpPr>
+        <p:cNvPr id="1" name=""/>
+        <p:cNvGrpSpPr/>
+        <p:nvPr/>
+      </p:nvGrpSpPr>
+      <p:grpSpPr>
+        <a:xfrm>
+          <a:off x="0" y="0"/>
+          <a:ext cx="0" cy="0"/>
+          <a:chOff x="0" y="0"/>
+          <a:chExt cx="0" cy="0"/>
+        </a:xfrm>
+      </p:grpSpPr>
+      <p:sp>
+        <p:nvSpPr>
+          <p:cNvPr id="2" name="Title 1">
+            <a:extLst>
+              <a:ext uri="{FF2B5EF4-FFF2-40B4-BE49-F238E27FC236}">
+                <a16:creationId xmlns:a16="http://schemas.microsoft.com/office/drawing/2014/main" id="{F0508855-F6C6-714A-B0B4-C7E671CAB3E8}"/>
+              </a:ext>
+            </a:extLst>
+          </p:cNvPr>
+          <p:cNvSpPr>
+            <a:spLocks noGrp="1"/>
+          </p:cNvSpPr>
+          <p:nvPr>
+            <p:ph type="title"/>
+          </p:nvPr>
+        </p:nvSpPr>
+        <p:spPr/>
+        <p:txBody>
+          <a:bodyPr/>
+          <a:lstStyle/>
+          <a:p>
+            <a:r>
+              <a:rPr lang="en-US" dirty="0"/>
+              <a:t>Variogram/</a:t>
+            </a:r>
+            <a:r>
+              <a:rPr lang="en-US" dirty="0" err="1"/>
+              <a:t>semivariogram</a:t>
+            </a:r>
+            <a:endParaRPr lang="en-US" dirty="0"/>
+          </a:p>
+        </p:txBody>
+      </p:sp>
+      <p:sp>
+        <p:nvSpPr>
+          <p:cNvPr id="3" name="Text Placeholder 2">
+            <a:extLst>
+              <a:ext uri="{FF2B5EF4-FFF2-40B4-BE49-F238E27FC236}">
+                <a16:creationId xmlns:a16="http://schemas.microsoft.com/office/drawing/2014/main" id="{312CDC9F-52F9-8142-9452-1367F54E1AF5}"/>
+              </a:ext>
+            </a:extLst>
+          </p:cNvPr>
+          <p:cNvSpPr>
+            <a:spLocks noGrp="1"/>
+          </p:cNvSpPr>
+          <p:nvPr>
+            <p:ph type="body" sz="quarter" idx="10"/>
+          </p:nvPr>
+        </p:nvSpPr>
+        <p:spPr/>
+        <p:txBody>
+          <a:bodyPr/>
+          <a:lstStyle/>
+          <a:p>
+            <a:r>
+              <a:rPr lang="en-US" dirty="0"/>
+              <a:t>1. Spatial Autocorrelation</a:t>
+            </a:r>
+          </a:p>
+          <a:p>
+            <a:endParaRPr lang="en-US" dirty="0"/>
+          </a:p>
+        </p:txBody>
+      </p:sp>
+      <p:pic>
+        <p:nvPicPr>
           <p:cNvPr id="6" name="Picture 5" descr="Chart, line chart&#10;&#10;Description automatically generated">
             <a:extLst>
               <a:ext uri="{FF2B5EF4-FFF2-40B4-BE49-F238E27FC236}">
@@ -6488,7 +7589,7 @@
     </p:spTree>
     <p:extLst>
       <p:ext uri="{BB962C8B-B14F-4D97-AF65-F5344CB8AC3E}">
-        <p14:creationId xmlns:p14="http://schemas.microsoft.com/office/powerpoint/2010/main" val="2150130493"/>
+        <p14:creationId xmlns:p14="http://schemas.microsoft.com/office/powerpoint/2010/main" val="971100302"/>
       </p:ext>
     </p:extLst>
   </p:cSld>
@@ -6498,7 +7599,7 @@
 </p:sld>
 </file>
 
-<file path=ppt/slides/slide7.xml><?xml version="1.0" encoding="utf-8"?>
+<file path=ppt/slides/slide8.xml><?xml version="1.0" encoding="utf-8"?>
 <p:sld xmlns:a="http://schemas.openxmlformats.org/drawingml/2006/main" xmlns:r="http://schemas.openxmlformats.org/officeDocument/2006/relationships" xmlns:p="http://schemas.openxmlformats.org/presentationml/2006/main">
   <p:cSld>
     <p:spTree>
@@ -6751,196 +7852,6 @@
 </p:sld>
 </file>
 
-<file path=ppt/slides/slide8.xml><?xml version="1.0" encoding="utf-8"?>
-<p:sld xmlns:a="http://schemas.openxmlformats.org/drawingml/2006/main" xmlns:r="http://schemas.openxmlformats.org/officeDocument/2006/relationships" xmlns:p="http://schemas.openxmlformats.org/presentationml/2006/main">
-  <p:cSld>
-    <p:spTree>
-      <p:nvGrpSpPr>
-        <p:cNvPr id="1" name=""/>
-        <p:cNvGrpSpPr/>
-        <p:nvPr/>
-      </p:nvGrpSpPr>
-      <p:grpSpPr>
-        <a:xfrm>
-          <a:off x="0" y="0"/>
-          <a:ext cx="0" cy="0"/>
-          <a:chOff x="0" y="0"/>
-          <a:chExt cx="0" cy="0"/>
-        </a:xfrm>
-      </p:grpSpPr>
-      <p:sp>
-        <p:nvSpPr>
-          <p:cNvPr id="2" name="Title 1">
-            <a:extLst>
-              <a:ext uri="{FF2B5EF4-FFF2-40B4-BE49-F238E27FC236}">
-                <a16:creationId xmlns:a16="http://schemas.microsoft.com/office/drawing/2014/main" id="{53C17DB7-ABE2-9249-BA6F-B38EAAF38A07}"/>
-              </a:ext>
-            </a:extLst>
-          </p:cNvPr>
-          <p:cNvSpPr>
-            <a:spLocks noGrp="1"/>
-          </p:cNvSpPr>
-          <p:nvPr>
-            <p:ph type="title"/>
-          </p:nvPr>
-        </p:nvSpPr>
-        <p:spPr/>
-        <p:txBody>
-          <a:bodyPr/>
-          <a:lstStyle/>
-          <a:p>
-            <a:r>
-              <a:rPr lang="en-US" dirty="0" err="1"/>
-              <a:t>Gearys</a:t>
-            </a:r>
-            <a:r>
-              <a:rPr lang="en-US" dirty="0"/>
-              <a:t> C</a:t>
-            </a:r>
-          </a:p>
-        </p:txBody>
-      </p:sp>
-      <p:sp>
-        <p:nvSpPr>
-          <p:cNvPr id="3" name="Text Placeholder 2">
-            <a:extLst>
-              <a:ext uri="{FF2B5EF4-FFF2-40B4-BE49-F238E27FC236}">
-                <a16:creationId xmlns:a16="http://schemas.microsoft.com/office/drawing/2014/main" id="{1713683F-6D57-C742-BE5C-0343C0B83E59}"/>
-              </a:ext>
-            </a:extLst>
-          </p:cNvPr>
-          <p:cNvSpPr>
-            <a:spLocks noGrp="1"/>
-          </p:cNvSpPr>
-          <p:nvPr>
-            <p:ph type="body" sz="quarter" idx="10"/>
-          </p:nvPr>
-        </p:nvSpPr>
-        <p:spPr/>
-        <p:txBody>
-          <a:bodyPr/>
-          <a:lstStyle/>
-          <a:p>
-            <a:r>
-              <a:rPr lang="en-US" dirty="0"/>
-              <a:t>1. Spatial Autocorrelation</a:t>
-            </a:r>
-          </a:p>
-          <a:p>
-            <a:endParaRPr lang="en-US" dirty="0"/>
-          </a:p>
-        </p:txBody>
-      </p:sp>
-      <p:sp>
-        <p:nvSpPr>
-          <p:cNvPr id="4" name="Rectangle 3">
-            <a:extLst>
-              <a:ext uri="{FF2B5EF4-FFF2-40B4-BE49-F238E27FC236}">
-                <a16:creationId xmlns:a16="http://schemas.microsoft.com/office/drawing/2014/main" id="{19FA0342-475B-6F44-BE4D-99B8D2851AC8}"/>
-              </a:ext>
-            </a:extLst>
-          </p:cNvPr>
-          <p:cNvSpPr/>
-          <p:nvPr/>
-        </p:nvSpPr>
-        <p:spPr>
-          <a:xfrm>
-            <a:off x="1049153" y="1017478"/>
-            <a:ext cx="7344077" cy="3108543"/>
-          </a:xfrm>
-          <a:prstGeom prst="rect">
-            <a:avLst/>
-          </a:prstGeom>
-        </p:spPr>
-        <p:txBody>
-          <a:bodyPr wrap="square">
-            <a:spAutoFit/>
-          </a:bodyPr>
-          <a:lstStyle/>
-          <a:p>
-            <a:endParaRPr lang="en-US" dirty="0">
-              <a:solidFill>
-                <a:srgbClr val="333333"/>
-              </a:solidFill>
-              <a:latin typeface="Source Sans Pro" panose="020B0503030403020204" pitchFamily="34" charset="0"/>
-            </a:endParaRPr>
-          </a:p>
-          <a:p>
-            <a:r>
-              <a:rPr lang="en-US" i="1" u="sng" dirty="0" err="1"/>
-              <a:t>Gearys</a:t>
-            </a:r>
-            <a:r>
-              <a:rPr lang="en-US" i="1" u="sng" dirty="0"/>
-              <a:t> C </a:t>
-            </a:r>
-            <a:r>
-              <a:rPr lang="en-US" dirty="0"/>
-              <a:t>determines if adjacent observations of the same attributes are correlated in multi- or bi-directional ways. </a:t>
-            </a:r>
-          </a:p>
-          <a:p>
-            <a:endParaRPr lang="en-US" dirty="0"/>
-          </a:p>
-          <a:p>
-            <a:r>
-              <a:rPr lang="en-US" dirty="0"/>
-              <a:t>The value of Geary’s C lies between 0 and some general value greater than 1. Values significantly lower than one demonstrate increasing positive spatial autocorrelation, while values significantly higher than one illustrate increasing negative spatial autocorrelation. </a:t>
-            </a:r>
-          </a:p>
-          <a:p>
-            <a:endParaRPr lang="en-US" dirty="0"/>
-          </a:p>
-          <a:p>
-            <a:r>
-              <a:rPr lang="en-US" i="1" u="sng" dirty="0"/>
-              <a:t>Geary’s C </a:t>
-            </a:r>
-            <a:r>
-              <a:rPr lang="en-US" dirty="0"/>
-              <a:t>is inversely related to Moran’s I, but it is not identical. Moran’s I is a measure of global spatial autocorrelation, while Geary’s C is more sensitive to local spatial autocorrelation.</a:t>
-            </a:r>
-          </a:p>
-          <a:p>
-            <a:endParaRPr lang="en-US" dirty="0"/>
-          </a:p>
-          <a:p>
-            <a:r>
-              <a:rPr lang="en-US" dirty="0"/>
-              <a:t>Geary’s test for spatial autocorrelation using a spatial weights matrix in weights list form. The assumptions underlying the test are sensitive to the form of the graph of </a:t>
-            </a:r>
-            <a:r>
-              <a:rPr lang="en-US" dirty="0" err="1"/>
-              <a:t>neighbour</a:t>
-            </a:r>
-            <a:r>
-              <a:rPr lang="en-US" dirty="0"/>
-              <a:t> relationships and other factors, and results may be checked against those of the </a:t>
-            </a:r>
-            <a:r>
-              <a:rPr lang="en-US" dirty="0" err="1"/>
-              <a:t>geary.mc</a:t>
-            </a:r>
-            <a:r>
-              <a:rPr lang="en-US" dirty="0"/>
-              <a:t> permutation</a:t>
-            </a:r>
-          </a:p>
-        </p:txBody>
-      </p:sp>
-    </p:spTree>
-    <p:extLst>
-      <p:ext uri="{BB962C8B-B14F-4D97-AF65-F5344CB8AC3E}">
-        <p14:creationId xmlns:p14="http://schemas.microsoft.com/office/powerpoint/2010/main" val="1874604877"/>
-      </p:ext>
-    </p:extLst>
-  </p:cSld>
-  <p:clrMapOvr>
-    <a:masterClrMapping/>
-  </p:clrMapOvr>
-</p:sld>
-</file>
-
 <file path=ppt/slides/slide9.xml><?xml version="1.0" encoding="utf-8"?>
 <p:sld xmlns:a="http://schemas.openxmlformats.org/drawingml/2006/main" xmlns:r="http://schemas.openxmlformats.org/officeDocument/2006/relationships" xmlns:p="http://schemas.openxmlformats.org/presentationml/2006/main">
   <p:cSld>
@@ -6981,11 +7892,11 @@
           <a:p>
             <a:r>
               <a:rPr lang="en-US" dirty="0" err="1"/>
-              <a:t>Getis</a:t>
-            </a:r>
-            <a:r>
-              <a:rPr lang="en-US" dirty="0"/>
-              <a:t>-Ord GI*</a:t>
+              <a:t>Gearys</a:t>
+            </a:r>
+            <a:r>
+              <a:rPr lang="en-US" dirty="0"/>
+              <a:t> C</a:t>
             </a:r>
           </a:p>
         </p:txBody>
@@ -7035,8 +7946,8 @@
         </p:nvSpPr>
         <p:spPr>
           <a:xfrm>
-            <a:off x="899962" y="1308401"/>
-            <a:ext cx="3335154" cy="1815882"/>
+            <a:off x="1049153" y="1017478"/>
+            <a:ext cx="7344077" cy="3108543"/>
           </a:xfrm>
           <a:prstGeom prst="rect">
             <a:avLst/>
@@ -7057,64 +7968,71 @@
           </a:p>
           <a:p>
             <a:r>
-              <a:rPr lang="en-US" dirty="0"/>
-              <a:t>Hotspot analysis using </a:t>
-            </a:r>
-            <a:r>
               <a:rPr lang="en-US" i="1" u="sng" dirty="0" err="1"/>
-              <a:t>Getis</a:t>
+              <a:t>Gearys</a:t>
             </a:r>
             <a:r>
               <a:rPr lang="en-US" i="1" u="sng" dirty="0"/>
-              <a:t>-Ord Gi*</a:t>
-            </a:r>
-            <a:r>
-              <a:rPr lang="en-US" dirty="0"/>
-              <a:t> statistic (sometimes referred to as GI-star) uses spatial vectors to identify the locations of statistically significant hot spots and cold spots in data. The z-scores and p-values indicates where features with either high or low values cluster spatially.</a:t>
-            </a:r>
-          </a:p>
-        </p:txBody>
-      </p:sp>
-      <p:pic>
-        <p:nvPicPr>
-          <p:cNvPr id="9" name="Picture 8" descr="Map&#10;&#10;Description automatically generated">
-            <a:extLst>
-              <a:ext uri="{FF2B5EF4-FFF2-40B4-BE49-F238E27FC236}">
-                <a16:creationId xmlns:a16="http://schemas.microsoft.com/office/drawing/2014/main" id="{6779E92B-3DB5-DF4D-8EF7-5BAFBAF410D3}"/>
-              </a:ext>
-            </a:extLst>
-          </p:cNvPr>
-          <p:cNvPicPr>
-            <a:picLocks noChangeAspect="1"/>
-          </p:cNvPicPr>
-          <p:nvPr/>
-        </p:nvPicPr>
-        <p:blipFill>
-          <a:blip r:embed="rId2">
-            <a:extLst>
-              <a:ext uri="{28A0092B-C50C-407E-A947-70E740481C1C}">
-                <a14:useLocalDpi xmlns:a14="http://schemas.microsoft.com/office/drawing/2010/main" val="0"/>
-              </a:ext>
-            </a:extLst>
-          </a:blip>
-          <a:stretch>
-            <a:fillRect/>
-          </a:stretch>
-        </p:blipFill>
-        <p:spPr>
-          <a:xfrm>
-            <a:off x="4712869" y="346271"/>
-            <a:ext cx="2938219" cy="3843391"/>
-          </a:xfrm>
-          <a:prstGeom prst="rect">
-            <a:avLst/>
-          </a:prstGeom>
-        </p:spPr>
-      </p:pic>
+              <a:t> C </a:t>
+            </a:r>
+            <a:r>
+              <a:rPr lang="en-US" dirty="0"/>
+              <a:t>determines if adjacent observations of the same attributes are correlated in multi- or bi-directional ways. </a:t>
+            </a:r>
+          </a:p>
+          <a:p>
+            <a:endParaRPr lang="en-US" dirty="0"/>
+          </a:p>
+          <a:p>
+            <a:r>
+              <a:rPr lang="en-US" dirty="0"/>
+              <a:t>The value of Geary’s C lies between 0 and some general value greater than 1. Values significantly lower than one demonstrate increasing positive spatial autocorrelation, while values significantly higher than one illustrate increasing negative spatial autocorrelation. </a:t>
+            </a:r>
+          </a:p>
+          <a:p>
+            <a:endParaRPr lang="en-US" dirty="0"/>
+          </a:p>
+          <a:p>
+            <a:r>
+              <a:rPr lang="en-US" i="1" u="sng" dirty="0"/>
+              <a:t>Geary’s C </a:t>
+            </a:r>
+            <a:r>
+              <a:rPr lang="en-US" dirty="0"/>
+              <a:t>is inversely related to Moran’s I, but it is not identical. Moran’s I is a measure of global spatial autocorrelation, while Geary’s C is more sensitive to local spatial autocorrelation.</a:t>
+            </a:r>
+          </a:p>
+          <a:p>
+            <a:endParaRPr lang="en-US" dirty="0"/>
+          </a:p>
+          <a:p>
+            <a:r>
+              <a:rPr lang="en-US" dirty="0"/>
+              <a:t>Geary’s test for spatial autocorrelation using a spatial weights matrix in weights list form. The assumptions underlying the test are sensitive to the form of the graph of </a:t>
+            </a:r>
+            <a:r>
+              <a:rPr lang="en-US" dirty="0" err="1"/>
+              <a:t>neighbour</a:t>
+            </a:r>
+            <a:r>
+              <a:rPr lang="en-US" dirty="0"/>
+              <a:t> relationships and other factors, and results may be checked against those of the </a:t>
+            </a:r>
+            <a:r>
+              <a:rPr lang="en-US" dirty="0" err="1"/>
+              <a:t>geary.mc</a:t>
+            </a:r>
+            <a:r>
+              <a:rPr lang="en-US" dirty="0"/>
+              <a:t> permutation</a:t>
+            </a:r>
+          </a:p>
+        </p:txBody>
+      </p:sp>
     </p:spTree>
     <p:extLst>
       <p:ext uri="{BB962C8B-B14F-4D97-AF65-F5344CB8AC3E}">
-        <p14:creationId xmlns:p14="http://schemas.microsoft.com/office/powerpoint/2010/main" val="3008153948"/>
+        <p14:creationId xmlns:p14="http://schemas.microsoft.com/office/powerpoint/2010/main" val="1874604877"/>
       </p:ext>
     </p:extLst>
   </p:cSld>

</xml_diff>